<commit_message>
finish simple version of recommender system
</commit_message>
<xml_diff>
--- a/Other/workflow.pptx
+++ b/Other/workflow.pptx
@@ -207,7 +207,7 @@
           <a:p>
             <a:fld id="{4929A9E9-B259-614E-963A-10A47C157E36}" type="datetimeFigureOut">
               <a:rPr lang="en-US" smtClean="0"/>
-              <a:t>8/22/17</a:t>
+              <a:t>8/24/17</a:t>
             </a:fld>
             <a:endParaRPr lang="en-US"/>
           </a:p>
@@ -690,7 +690,7 @@
           <a:p>
             <a:fld id="{00217F52-AE42-FA41-BE5B-C0D44E185430}" type="datetimeFigureOut">
               <a:rPr lang="en-US" smtClean="0"/>
-              <a:t>8/22/17</a:t>
+              <a:t>8/24/17</a:t>
             </a:fld>
             <a:endParaRPr lang="en-US"/>
           </a:p>
@@ -860,7 +860,7 @@
           <a:p>
             <a:fld id="{00217F52-AE42-FA41-BE5B-C0D44E185430}" type="datetimeFigureOut">
               <a:rPr lang="en-US" smtClean="0"/>
-              <a:t>8/22/17</a:t>
+              <a:t>8/24/17</a:t>
             </a:fld>
             <a:endParaRPr lang="en-US"/>
           </a:p>
@@ -1040,7 +1040,7 @@
           <a:p>
             <a:fld id="{00217F52-AE42-FA41-BE5B-C0D44E185430}" type="datetimeFigureOut">
               <a:rPr lang="en-US" smtClean="0"/>
-              <a:t>8/22/17</a:t>
+              <a:t>8/24/17</a:t>
             </a:fld>
             <a:endParaRPr lang="en-US"/>
           </a:p>
@@ -1210,7 +1210,7 @@
           <a:p>
             <a:fld id="{00217F52-AE42-FA41-BE5B-C0D44E185430}" type="datetimeFigureOut">
               <a:rPr lang="en-US" smtClean="0"/>
-              <a:t>8/22/17</a:t>
+              <a:t>8/24/17</a:t>
             </a:fld>
             <a:endParaRPr lang="en-US"/>
           </a:p>
@@ -1456,7 +1456,7 @@
           <a:p>
             <a:fld id="{00217F52-AE42-FA41-BE5B-C0D44E185430}" type="datetimeFigureOut">
               <a:rPr lang="en-US" smtClean="0"/>
-              <a:t>8/22/17</a:t>
+              <a:t>8/24/17</a:t>
             </a:fld>
             <a:endParaRPr lang="en-US"/>
           </a:p>
@@ -1688,7 +1688,7 @@
           <a:p>
             <a:fld id="{00217F52-AE42-FA41-BE5B-C0D44E185430}" type="datetimeFigureOut">
               <a:rPr lang="en-US" smtClean="0"/>
-              <a:t>8/22/17</a:t>
+              <a:t>8/24/17</a:t>
             </a:fld>
             <a:endParaRPr lang="en-US"/>
           </a:p>
@@ -2055,7 +2055,7 @@
           <a:p>
             <a:fld id="{00217F52-AE42-FA41-BE5B-C0D44E185430}" type="datetimeFigureOut">
               <a:rPr lang="en-US" smtClean="0"/>
-              <a:t>8/22/17</a:t>
+              <a:t>8/24/17</a:t>
             </a:fld>
             <a:endParaRPr lang="en-US"/>
           </a:p>
@@ -2173,7 +2173,7 @@
           <a:p>
             <a:fld id="{00217F52-AE42-FA41-BE5B-C0D44E185430}" type="datetimeFigureOut">
               <a:rPr lang="en-US" smtClean="0"/>
-              <a:t>8/22/17</a:t>
+              <a:t>8/24/17</a:t>
             </a:fld>
             <a:endParaRPr lang="en-US"/>
           </a:p>
@@ -2268,7 +2268,7 @@
           <a:p>
             <a:fld id="{00217F52-AE42-FA41-BE5B-C0D44E185430}" type="datetimeFigureOut">
               <a:rPr lang="en-US" smtClean="0"/>
-              <a:t>8/22/17</a:t>
+              <a:t>8/24/17</a:t>
             </a:fld>
             <a:endParaRPr lang="en-US"/>
           </a:p>
@@ -2545,7 +2545,7 @@
           <a:p>
             <a:fld id="{00217F52-AE42-FA41-BE5B-C0D44E185430}" type="datetimeFigureOut">
               <a:rPr lang="en-US" smtClean="0"/>
-              <a:t>8/22/17</a:t>
+              <a:t>8/24/17</a:t>
             </a:fld>
             <a:endParaRPr lang="en-US"/>
           </a:p>
@@ -2798,7 +2798,7 @@
           <a:p>
             <a:fld id="{00217F52-AE42-FA41-BE5B-C0D44E185430}" type="datetimeFigureOut">
               <a:rPr lang="en-US" smtClean="0"/>
-              <a:t>8/22/17</a:t>
+              <a:t>8/24/17</a:t>
             </a:fld>
             <a:endParaRPr lang="en-US"/>
           </a:p>
@@ -3011,7 +3011,7 @@
           <a:p>
             <a:fld id="{00217F52-AE42-FA41-BE5B-C0D44E185430}" type="datetimeFigureOut">
               <a:rPr lang="en-US" smtClean="0"/>
-              <a:t>8/22/17</a:t>
+              <a:t>8/24/17</a:t>
             </a:fld>
             <a:endParaRPr lang="en-US"/>
           </a:p>
@@ -3424,8 +3424,8 @@
         </p:nvSpPr>
         <p:spPr>
           <a:xfrm>
-            <a:off x="40548" y="82242"/>
-            <a:ext cx="12079733" cy="6656825"/>
+            <a:off x="70338" y="211015"/>
+            <a:ext cx="12069816" cy="6179737"/>
           </a:xfrm>
           <a:prstGeom prst="rect">
             <a:avLst/>
@@ -3472,8 +3472,8 @@
         </p:nvSpPr>
         <p:spPr>
           <a:xfrm>
-            <a:off x="348791" y="1144110"/>
-            <a:ext cx="1371600" cy="2103120"/>
+            <a:off x="197600" y="2236897"/>
+            <a:ext cx="938356" cy="1800518"/>
           </a:xfrm>
           <a:prstGeom prst="rect">
             <a:avLst/>
@@ -3515,8 +3515,8 @@
         </p:nvSpPr>
         <p:spPr>
           <a:xfrm>
-            <a:off x="501191" y="1296510"/>
-            <a:ext cx="1371600" cy="2103120"/>
+            <a:off x="350000" y="2389297"/>
+            <a:ext cx="938356" cy="1800518"/>
           </a:xfrm>
           <a:prstGeom prst="rect">
             <a:avLst/>
@@ -3558,8 +3558,8 @@
         </p:nvSpPr>
         <p:spPr>
           <a:xfrm>
-            <a:off x="653591" y="1448910"/>
-            <a:ext cx="1371600" cy="2103120"/>
+            <a:off x="502400" y="2541697"/>
+            <a:ext cx="938356" cy="1800518"/>
           </a:xfrm>
           <a:prstGeom prst="rect">
             <a:avLst/>
@@ -3601,8 +3601,8 @@
         </p:nvSpPr>
         <p:spPr>
           <a:xfrm>
-            <a:off x="3820406" y="1329188"/>
-            <a:ext cx="1371600" cy="2103748"/>
+            <a:off x="2101941" y="2211609"/>
+            <a:ext cx="1079359" cy="2121763"/>
           </a:xfrm>
           <a:prstGeom prst="roundRect">
             <a:avLst/>
@@ -3647,8 +3647,8 @@
         </p:nvSpPr>
         <p:spPr>
           <a:xfrm>
-            <a:off x="7047468" y="1327340"/>
-            <a:ext cx="1371600" cy="2103748"/>
+            <a:off x="3845530" y="2212863"/>
+            <a:ext cx="1079359" cy="2121763"/>
           </a:xfrm>
           <a:prstGeom prst="roundRect">
             <a:avLst/>
@@ -3690,8 +3690,8 @@
         </p:nvSpPr>
         <p:spPr>
           <a:xfrm>
-            <a:off x="10134601" y="1297890"/>
-            <a:ext cx="1371600" cy="2103120"/>
+            <a:off x="10887693" y="2191934"/>
+            <a:ext cx="1079359" cy="2121130"/>
           </a:xfrm>
           <a:prstGeom prst="rect">
             <a:avLst/>
@@ -3733,8 +3733,8 @@
         </p:nvSpPr>
         <p:spPr>
           <a:xfrm>
-            <a:off x="2494368" y="2192562"/>
-            <a:ext cx="671332" cy="304800"/>
+            <a:off x="1508442" y="3084818"/>
+            <a:ext cx="535613" cy="304800"/>
           </a:xfrm>
           <a:prstGeom prst="rightArrow">
             <a:avLst/>
@@ -3776,8 +3776,8 @@
         </p:nvSpPr>
         <p:spPr>
           <a:xfrm>
-            <a:off x="5709749" y="2196024"/>
-            <a:ext cx="671332" cy="304800"/>
+            <a:off x="3243798" y="3039156"/>
+            <a:ext cx="528294" cy="307410"/>
           </a:xfrm>
           <a:prstGeom prst="rightArrow">
             <a:avLst/>
@@ -3807,7 +3807,7 @@
           <a:lstStyle/>
           <a:p>
             <a:pPr algn="ctr"/>
-            <a:endParaRPr lang="en-US"/>
+            <a:endParaRPr lang="en-US" sz="1700"/>
           </a:p>
         </p:txBody>
       </p:sp>
@@ -3819,8 +3819,8 @@
         </p:nvSpPr>
         <p:spPr>
           <a:xfrm>
-            <a:off x="8849189" y="2226208"/>
-            <a:ext cx="671332" cy="304800"/>
+            <a:off x="4996957" y="3039156"/>
+            <a:ext cx="528294" cy="307410"/>
           </a:xfrm>
           <a:prstGeom prst="rightArrow">
             <a:avLst/>
@@ -3850,7 +3850,7 @@
           <a:lstStyle/>
           <a:p>
             <a:pPr algn="ctr"/>
-            <a:endParaRPr lang="en-US"/>
+            <a:endParaRPr lang="en-US" sz="1700"/>
           </a:p>
         </p:txBody>
       </p:sp>
@@ -3862,8 +3862,8 @@
         </p:nvSpPr>
         <p:spPr>
           <a:xfrm>
-            <a:off x="707387" y="2160296"/>
-            <a:ext cx="1219200" cy="369332"/>
+            <a:off x="503527" y="2914052"/>
+            <a:ext cx="834094" cy="646331"/>
           </a:xfrm>
           <a:prstGeom prst="rect">
             <a:avLst/>
@@ -3893,8 +3893,8 @@
         </p:nvSpPr>
         <p:spPr>
           <a:xfrm>
-            <a:off x="3820405" y="635659"/>
-            <a:ext cx="1367244" cy="646331"/>
+            <a:off x="2115826" y="1719810"/>
+            <a:ext cx="1075931" cy="369332"/>
           </a:xfrm>
           <a:prstGeom prst="rect">
             <a:avLst/>
@@ -3910,7 +3910,7 @@
             <a:pPr algn="ctr"/>
             <a:r>
               <a:rPr lang="en-US" dirty="0" smtClean="0"/>
-              <a:t>MapReduce Job1</a:t>
+              <a:t>Job 1</a:t>
             </a:r>
             <a:endParaRPr lang="en-US" dirty="0"/>
           </a:p>
@@ -3924,8 +3924,8 @@
         </p:nvSpPr>
         <p:spPr>
           <a:xfrm>
-            <a:off x="10210801" y="2193942"/>
-            <a:ext cx="1219200" cy="369332"/>
+            <a:off x="10963893" y="3087985"/>
+            <a:ext cx="959430" cy="353943"/>
           </a:xfrm>
           <a:prstGeom prst="rect">
             <a:avLst/>
@@ -3940,10 +3940,10 @@
           <a:p>
             <a:pPr algn="ctr"/>
             <a:r>
-              <a:rPr lang="en-US" dirty="0" smtClean="0"/>
+              <a:rPr lang="en-US" sz="1700" dirty="0" smtClean="0"/>
               <a:t>Output</a:t>
             </a:r>
-            <a:endParaRPr lang="en-US" dirty="0"/>
+            <a:endParaRPr lang="en-US" sz="1700" dirty="0"/>
           </a:p>
         </p:txBody>
       </p:sp>
@@ -3955,8 +3955,8 @@
         </p:nvSpPr>
         <p:spPr>
           <a:xfrm>
-            <a:off x="7060596" y="698620"/>
-            <a:ext cx="1371602" cy="646331"/>
+            <a:off x="3864630" y="1713462"/>
+            <a:ext cx="1079361" cy="369332"/>
           </a:xfrm>
           <a:prstGeom prst="rect">
             <a:avLst/>
@@ -3972,7 +3972,7 @@
             <a:pPr algn="ctr"/>
             <a:r>
               <a:rPr lang="en-US" dirty="0" smtClean="0"/>
-              <a:t>MapReduce Job2</a:t>
+              <a:t>Job 2</a:t>
             </a:r>
             <a:endParaRPr lang="en-US" dirty="0"/>
           </a:p>
@@ -3986,8 +3986,8 @@
         </p:nvSpPr>
         <p:spPr>
           <a:xfrm>
-            <a:off x="3645283" y="115931"/>
-            <a:ext cx="5266481" cy="523220"/>
+            <a:off x="3158359" y="426407"/>
+            <a:ext cx="6103652" cy="584775"/>
           </a:xfrm>
           <a:prstGeom prst="rect">
             <a:avLst/>
@@ -4002,23 +4002,23 @@
           <a:p>
             <a:pPr algn="ctr"/>
             <a:r>
-              <a:rPr lang="en-US" sz="2800" dirty="0" smtClean="0"/>
+              <a:rPr lang="en-US" sz="3200" dirty="0" smtClean="0"/>
               <a:t>Recommender System Workflow</a:t>
             </a:r>
-            <a:endParaRPr lang="en-US" sz="2800" dirty="0"/>
-          </a:p>
-        </p:txBody>
-      </p:sp>
-      <p:sp>
-        <p:nvSpPr>
-          <p:cNvPr id="2" name="TextBox 1"/>
+            <a:endParaRPr lang="en-US" sz="3200" dirty="0"/>
+          </a:p>
+        </p:txBody>
+      </p:sp>
+      <p:sp>
+        <p:nvSpPr>
+          <p:cNvPr id="27" name="TextBox 26"/>
           <p:cNvSpPr txBox="1"/>
           <p:nvPr/>
         </p:nvSpPr>
         <p:spPr>
           <a:xfrm>
-            <a:off x="40548" y="3785613"/>
-            <a:ext cx="2658588" cy="2862322"/>
+            <a:off x="2102525" y="2783213"/>
+            <a:ext cx="1075931" cy="353943"/>
           </a:xfrm>
           <a:prstGeom prst="rect">
             <a:avLst/>
@@ -4031,93 +4031,25 @@
           </a:bodyPr>
           <a:lstStyle/>
           <a:p>
-            <a:r>
-              <a:rPr lang="en-US" dirty="0" smtClean="0"/>
-              <a:t>Input 1: Transition Matrix:</a:t>
-            </a:r>
-          </a:p>
-          <a:p>
-            <a:pPr marL="342900" indent="-342900">
-              <a:buAutoNum type="arabicPlain"/>
-            </a:pPr>
-            <a:r>
-              <a:rPr lang="en-US" dirty="0" smtClean="0"/>
-              <a:t>2, 7, 8</a:t>
-            </a:r>
-          </a:p>
-          <a:p>
-            <a:pPr marL="342900" indent="-342900">
-              <a:buAutoNum type="arabicPlain"/>
-            </a:pPr>
-            <a:r>
-              <a:rPr lang="en-US" dirty="0" smtClean="0"/>
-              <a:t>4, 9, 10</a:t>
-            </a:r>
-          </a:p>
-          <a:p>
-            <a:pPr marL="342900" indent="-342900">
-              <a:buAutoNum type="arabicPlain"/>
-            </a:pPr>
-            <a:r>
-              <a:rPr lang="en-US" dirty="0" smtClean="0"/>
-              <a:t>1, 8, 31</a:t>
-            </a:r>
-          </a:p>
-          <a:p>
-            <a:endParaRPr lang="en-US" dirty="0"/>
-          </a:p>
-          <a:p>
-            <a:r>
-              <a:rPr lang="en-US" dirty="0" smtClean="0"/>
-              <a:t>Input2: Initial Page Rank</a:t>
-            </a:r>
-          </a:p>
-          <a:p>
-            <a:pPr marL="342900" indent="-342900">
-              <a:buAutoNum type="arabicPlain"/>
-            </a:pPr>
-            <a:r>
-              <a:rPr lang="en-US" dirty="0" smtClean="0"/>
-              <a:t>1/N</a:t>
-            </a:r>
-          </a:p>
-          <a:p>
-            <a:pPr marL="342900" indent="-342900">
-              <a:buAutoNum type="arabicPlain"/>
-            </a:pPr>
-            <a:r>
-              <a:rPr lang="en-US" dirty="0" smtClean="0"/>
-              <a:t>1/N</a:t>
-            </a:r>
-          </a:p>
-          <a:p>
-            <a:pPr marL="342900" indent="-342900">
-              <a:buAutoNum type="arabicPlain"/>
-            </a:pPr>
-            <a:r>
-              <a:rPr lang="en-US" dirty="0" smtClean="0"/>
-              <a:t>1/N</a:t>
-            </a:r>
-          </a:p>
-          <a:p>
-            <a:r>
-              <a:rPr lang="en-US" dirty="0" smtClean="0"/>
-              <a:t>(Assume equal initial PR)</a:t>
-            </a:r>
-            <a:endParaRPr lang="en-US" dirty="0"/>
-          </a:p>
-        </p:txBody>
-      </p:sp>
-      <p:sp>
-        <p:nvSpPr>
-          <p:cNvPr id="27" name="TextBox 26"/>
+            <a:pPr algn="ctr"/>
+            <a:r>
+              <a:rPr lang="en-US" sz="1700" dirty="0" smtClean="0"/>
+              <a:t>Mapper</a:t>
+            </a:r>
+            <a:endParaRPr lang="en-US" sz="1700" dirty="0"/>
+          </a:p>
+        </p:txBody>
+      </p:sp>
+      <p:sp>
+        <p:nvSpPr>
+          <p:cNvPr id="29" name="TextBox 28"/>
           <p:cNvSpPr txBox="1"/>
           <p:nvPr/>
         </p:nvSpPr>
         <p:spPr>
           <a:xfrm>
-            <a:off x="3820405" y="1753642"/>
-            <a:ext cx="1367244" cy="369332"/>
+            <a:off x="2111741" y="3329452"/>
+            <a:ext cx="1075931" cy="353943"/>
           </a:xfrm>
           <a:prstGeom prst="rect">
             <a:avLst/>
@@ -4132,23 +4064,23 @@
           <a:p>
             <a:pPr algn="ctr"/>
             <a:r>
-              <a:rPr lang="en-US" dirty="0" smtClean="0"/>
-              <a:t>Mapper 1</a:t>
-            </a:r>
-            <a:endParaRPr lang="en-US" dirty="0"/>
-          </a:p>
-        </p:txBody>
-      </p:sp>
-      <p:sp>
-        <p:nvSpPr>
-          <p:cNvPr id="28" name="TextBox 27"/>
+              <a:rPr lang="en-US" sz="1700" dirty="0" smtClean="0"/>
+              <a:t>Reducer</a:t>
+            </a:r>
+            <a:endParaRPr lang="en-US" sz="1700" dirty="0"/>
+          </a:p>
+        </p:txBody>
+      </p:sp>
+      <p:sp>
+        <p:nvSpPr>
+          <p:cNvPr id="35" name="TextBox 34"/>
           <p:cNvSpPr txBox="1"/>
           <p:nvPr/>
         </p:nvSpPr>
         <p:spPr>
           <a:xfrm>
-            <a:off x="3820405" y="2217370"/>
-            <a:ext cx="1367244" cy="369332"/>
+            <a:off x="315490" y="1745799"/>
+            <a:ext cx="935376" cy="369332"/>
           </a:xfrm>
           <a:prstGeom prst="rect">
             <a:avLst/>
@@ -4163,8 +4095,8 @@
           <a:p>
             <a:pPr algn="ctr"/>
             <a:r>
-              <a:rPr lang="en-US" dirty="0" smtClean="0"/>
-              <a:t>Mapper 2</a:t>
+              <a:rPr lang="en-US" smtClean="0"/>
+              <a:t>Input</a:t>
             </a:r>
             <a:endParaRPr lang="en-US" dirty="0"/>
           </a:p>
@@ -4172,14 +4104,14 @@
       </p:sp>
       <p:sp>
         <p:nvSpPr>
-          <p:cNvPr id="29" name="TextBox 28"/>
+          <p:cNvPr id="36" name="TextBox 35"/>
           <p:cNvSpPr txBox="1"/>
           <p:nvPr/>
         </p:nvSpPr>
         <p:spPr>
           <a:xfrm>
-            <a:off x="3820407" y="2749180"/>
-            <a:ext cx="1367244" cy="369332"/>
+            <a:off x="10887693" y="1710299"/>
+            <a:ext cx="1075931" cy="372495"/>
           </a:xfrm>
           <a:prstGeom prst="rect">
             <a:avLst/>
@@ -4195,7 +4127,7 @@
             <a:pPr algn="ctr"/>
             <a:r>
               <a:rPr lang="en-US" dirty="0" smtClean="0"/>
-              <a:t>Reducer</a:t>
+              <a:t>Output</a:t>
             </a:r>
             <a:endParaRPr lang="en-US" dirty="0"/>
           </a:p>
@@ -4203,762 +4135,21 @@
       </p:sp>
       <p:sp>
         <p:nvSpPr>
-          <p:cNvPr id="30" name="TextBox 29"/>
-          <p:cNvSpPr txBox="1"/>
-          <p:nvPr/>
-        </p:nvSpPr>
-        <p:spPr>
-          <a:xfrm>
-            <a:off x="7034338" y="1667114"/>
-            <a:ext cx="1367244" cy="369332"/>
-          </a:xfrm>
-          <a:prstGeom prst="rect">
-            <a:avLst/>
-          </a:prstGeom>
-          <a:noFill/>
-        </p:spPr>
-        <p:txBody>
-          <a:bodyPr wrap="square" rtlCol="0">
-            <a:spAutoFit/>
-          </a:bodyPr>
-          <a:lstStyle/>
-          <a:p>
-            <a:pPr algn="ctr"/>
-            <a:r>
-              <a:rPr lang="en-US" smtClean="0"/>
-              <a:t>Mapper 1</a:t>
-            </a:r>
-            <a:endParaRPr lang="en-US" dirty="0"/>
-          </a:p>
-        </p:txBody>
-      </p:sp>
-      <p:sp>
-        <p:nvSpPr>
-          <p:cNvPr id="31" name="TextBox 30"/>
-          <p:cNvSpPr txBox="1"/>
-          <p:nvPr/>
-        </p:nvSpPr>
-        <p:spPr>
-          <a:xfrm>
-            <a:off x="7034338" y="2702569"/>
-            <a:ext cx="1367244" cy="369332"/>
-          </a:xfrm>
-          <a:prstGeom prst="rect">
-            <a:avLst/>
-          </a:prstGeom>
-          <a:noFill/>
-        </p:spPr>
-        <p:txBody>
-          <a:bodyPr wrap="square" rtlCol="0">
-            <a:spAutoFit/>
-          </a:bodyPr>
-          <a:lstStyle/>
-          <a:p>
-            <a:pPr algn="ctr"/>
-            <a:r>
-              <a:rPr lang="en-US" dirty="0" smtClean="0"/>
-              <a:t>Reducer</a:t>
-            </a:r>
-            <a:endParaRPr lang="en-US" dirty="0"/>
-          </a:p>
-        </p:txBody>
-      </p:sp>
-      <p:graphicFrame>
-        <p:nvGraphicFramePr>
-          <p:cNvPr id="4" name="Table 3"/>
-          <p:cNvGraphicFramePr>
-            <a:graphicFrameLocks noGrp="1"/>
-          </p:cNvGraphicFramePr>
-          <p:nvPr>
-            <p:extLst>
-              <p:ext uri="{D42A27DB-BD31-4B8C-83A1-F6EECF244321}">
-                <p14:modId xmlns:p14="http://schemas.microsoft.com/office/powerpoint/2010/main" val="1540298085"/>
-              </p:ext>
-            </p:extLst>
-          </p:nvPr>
-        </p:nvGraphicFramePr>
-        <p:xfrm>
-          <a:off x="2702365" y="4819135"/>
-          <a:ext cx="3576158" cy="1828800"/>
-        </p:xfrm>
-        <a:graphic>
-          <a:graphicData uri="http://schemas.openxmlformats.org/drawingml/2006/table">
-            <a:tbl>
-              <a:tblPr firstRow="1" bandRow="1">
-                <a:tableStyleId>{073A0DAA-6AF3-43AB-8588-CEC1D06C72B9}</a:tableStyleId>
-              </a:tblPr>
-              <a:tblGrid>
-                <a:gridCol w="712785"/>
-                <a:gridCol w="2863373"/>
-              </a:tblGrid>
-              <a:tr h="230235">
-                <a:tc>
-                  <a:txBody>
-                    <a:bodyPr/>
-                    <a:lstStyle/>
-                    <a:p>
-                      <a:pPr algn="ctr"/>
-                      <a:r>
-                        <a:rPr lang="en-US" dirty="0" smtClean="0"/>
-                        <a:t>Key</a:t>
-                      </a:r>
-                      <a:endParaRPr lang="en-US" dirty="0"/>
-                    </a:p>
-                  </a:txBody>
-                  <a:tcPr/>
-                </a:tc>
-                <a:tc>
-                  <a:txBody>
-                    <a:bodyPr/>
-                    <a:lstStyle/>
-                    <a:p>
-                      <a:pPr algn="ctr"/>
-                      <a:r>
-                        <a:rPr lang="en-US" dirty="0" smtClean="0"/>
-                        <a:t>Value</a:t>
-                      </a:r>
-                      <a:r>
-                        <a:rPr lang="en-US" baseline="0" dirty="0" smtClean="0"/>
-                        <a:t> </a:t>
-                      </a:r>
-                      <a:endParaRPr lang="en-US" dirty="0"/>
-                    </a:p>
-                  </a:txBody>
-                  <a:tcPr/>
-                </a:tc>
-              </a:tr>
-              <a:tr h="230235">
-                <a:tc>
-                  <a:txBody>
-                    <a:bodyPr/>
-                    <a:lstStyle/>
-                    <a:p>
-                      <a:pPr algn="ctr"/>
-                      <a:r>
-                        <a:rPr lang="en-US" dirty="0" smtClean="0"/>
-                        <a:t>Page</a:t>
-                      </a:r>
-                      <a:endParaRPr lang="en-US" dirty="0"/>
-                    </a:p>
-                  </a:txBody>
-                  <a:tcPr/>
-                </a:tc>
-                <a:tc>
-                  <a:txBody>
-                    <a:bodyPr/>
-                    <a:lstStyle/>
-                    <a:p>
-                      <a:pPr algn="ctr"/>
-                      <a:r>
-                        <a:rPr lang="en-US" dirty="0" smtClean="0"/>
-                        <a:t>List&lt;Values&gt;</a:t>
-                      </a:r>
-                      <a:endParaRPr lang="en-US" dirty="0"/>
-                    </a:p>
-                  </a:txBody>
-                  <a:tcPr/>
-                </a:tc>
-              </a:tr>
-              <a:tr h="230235">
-                <a:tc>
-                  <a:txBody>
-                    <a:bodyPr/>
-                    <a:lstStyle/>
-                    <a:p>
-                      <a:pPr algn="ctr"/>
-                      <a:r>
-                        <a:rPr lang="en-US" dirty="0" smtClean="0"/>
-                        <a:t>1</a:t>
-                      </a:r>
-                      <a:endParaRPr lang="en-US" dirty="0"/>
-                    </a:p>
-                  </a:txBody>
-                  <a:tcPr/>
-                </a:tc>
-                <a:tc>
-                  <a:txBody>
-                    <a:bodyPr/>
-                    <a:lstStyle/>
-                    <a:p>
-                      <a:pPr algn="ctr"/>
-                      <a:r>
-                        <a:rPr lang="en-US" dirty="0" smtClean="0"/>
-                        <a:t>&lt;2=1/3,</a:t>
-                      </a:r>
-                      <a:r>
-                        <a:rPr lang="en-US" baseline="0" dirty="0" smtClean="0"/>
-                        <a:t> 7=1/3, 8=1/3, 1/N&gt;</a:t>
-                      </a:r>
-                      <a:endParaRPr lang="en-US" dirty="0"/>
-                    </a:p>
-                  </a:txBody>
-                  <a:tcPr/>
-                </a:tc>
-              </a:tr>
-              <a:tr h="230235">
-                <a:tc>
-                  <a:txBody>
-                    <a:bodyPr/>
-                    <a:lstStyle/>
-                    <a:p>
-                      <a:pPr algn="ctr"/>
-                      <a:r>
-                        <a:rPr lang="en-US" dirty="0" smtClean="0"/>
-                        <a:t>2</a:t>
-                      </a:r>
-                      <a:endParaRPr lang="en-US" dirty="0"/>
-                    </a:p>
-                  </a:txBody>
-                  <a:tcPr/>
-                </a:tc>
-                <a:tc>
-                  <a:txBody>
-                    <a:bodyPr/>
-                    <a:lstStyle/>
-                    <a:p>
-                      <a:pPr algn="ctr"/>
-                      <a:r>
-                        <a:rPr lang="en-US" dirty="0" smtClean="0"/>
-                        <a:t>&lt;4=1/3,</a:t>
-                      </a:r>
-                      <a:r>
-                        <a:rPr lang="en-US" baseline="0" dirty="0" smtClean="0"/>
-                        <a:t> 9=1/3, 10=1/3, 1/N&gt;</a:t>
-                      </a:r>
-                      <a:endParaRPr lang="en-US" dirty="0"/>
-                    </a:p>
-                  </a:txBody>
-                  <a:tcPr/>
-                </a:tc>
-              </a:tr>
-              <a:tr h="230235">
-                <a:tc>
-                  <a:txBody>
-                    <a:bodyPr/>
-                    <a:lstStyle/>
-                    <a:p>
-                      <a:pPr algn="ctr"/>
-                      <a:r>
-                        <a:rPr lang="en-US" dirty="0" smtClean="0"/>
-                        <a:t>3</a:t>
-                      </a:r>
-                      <a:endParaRPr lang="en-US" dirty="0"/>
-                    </a:p>
-                  </a:txBody>
-                  <a:tcPr/>
-                </a:tc>
-                <a:tc>
-                  <a:txBody>
-                    <a:bodyPr/>
-                    <a:lstStyle/>
-                    <a:p>
-                      <a:pPr algn="ctr"/>
-                      <a:r>
-                        <a:rPr lang="en-US" dirty="0" smtClean="0"/>
-                        <a:t>&lt;1=1/3, 8=1/3, 31=1/3,</a:t>
-                      </a:r>
-                      <a:r>
-                        <a:rPr lang="en-US" baseline="0" dirty="0" smtClean="0"/>
-                        <a:t> 1/N&gt;</a:t>
-                      </a:r>
-                      <a:endParaRPr lang="en-US" dirty="0"/>
-                    </a:p>
-                  </a:txBody>
-                  <a:tcPr/>
-                </a:tc>
-              </a:tr>
-            </a:tbl>
-          </a:graphicData>
-        </a:graphic>
-      </p:graphicFrame>
-      <p:graphicFrame>
-        <p:nvGraphicFramePr>
-          <p:cNvPr id="34" name="Table 33"/>
-          <p:cNvGraphicFramePr>
-            <a:graphicFrameLocks noGrp="1"/>
-          </p:cNvGraphicFramePr>
-          <p:nvPr>
-            <p:extLst>
-              <p:ext uri="{D42A27DB-BD31-4B8C-83A1-F6EECF244321}">
-                <p14:modId xmlns:p14="http://schemas.microsoft.com/office/powerpoint/2010/main" val="2022033657"/>
-              </p:ext>
-            </p:extLst>
-          </p:nvPr>
-        </p:nvGraphicFramePr>
-        <p:xfrm>
-          <a:off x="6508502" y="4819135"/>
-          <a:ext cx="3396119" cy="1828800"/>
-        </p:xfrm>
-        <a:graphic>
-          <a:graphicData uri="http://schemas.openxmlformats.org/drawingml/2006/table">
-            <a:tbl>
-              <a:tblPr firstRow="1" bandRow="1">
-                <a:tableStyleId>{073A0DAA-6AF3-43AB-8588-CEC1D06C72B9}</a:tableStyleId>
-              </a:tblPr>
-              <a:tblGrid>
-                <a:gridCol w="644268"/>
-                <a:gridCol w="2751851"/>
-              </a:tblGrid>
-              <a:tr h="230235">
-                <a:tc>
-                  <a:txBody>
-                    <a:bodyPr/>
-                    <a:lstStyle/>
-                    <a:p>
-                      <a:pPr algn="ctr"/>
-                      <a:r>
-                        <a:rPr lang="en-US" dirty="0" smtClean="0"/>
-                        <a:t>Key</a:t>
-                      </a:r>
-                      <a:endParaRPr lang="en-US" dirty="0"/>
-                    </a:p>
-                  </a:txBody>
-                  <a:tcPr/>
-                </a:tc>
-                <a:tc>
-                  <a:txBody>
-                    <a:bodyPr/>
-                    <a:lstStyle/>
-                    <a:p>
-                      <a:pPr algn="ctr"/>
-                      <a:r>
-                        <a:rPr lang="en-US" dirty="0" smtClean="0"/>
-                        <a:t>Value</a:t>
-                      </a:r>
-                      <a:endParaRPr lang="en-US" dirty="0"/>
-                    </a:p>
-                  </a:txBody>
-                  <a:tcPr/>
-                </a:tc>
-              </a:tr>
-              <a:tr h="230235">
-                <a:tc>
-                  <a:txBody>
-                    <a:bodyPr/>
-                    <a:lstStyle/>
-                    <a:p>
-                      <a:pPr algn="ctr"/>
-                      <a:r>
-                        <a:rPr lang="en-US" dirty="0" smtClean="0"/>
-                        <a:t>Page</a:t>
-                      </a:r>
-                      <a:endParaRPr lang="en-US" dirty="0"/>
-                    </a:p>
-                  </a:txBody>
-                  <a:tcPr/>
-                </a:tc>
-                <a:tc>
-                  <a:txBody>
-                    <a:bodyPr/>
-                    <a:lstStyle/>
-                    <a:p>
-                      <a:pPr algn="ctr"/>
-                      <a:r>
-                        <a:rPr lang="en-US" dirty="0" smtClean="0"/>
-                        <a:t>Page Rank Value</a:t>
-                      </a:r>
-                      <a:endParaRPr lang="en-US" dirty="0"/>
-                    </a:p>
-                  </a:txBody>
-                  <a:tcPr/>
-                </a:tc>
-              </a:tr>
-              <a:tr h="230235">
-                <a:tc>
-                  <a:txBody>
-                    <a:bodyPr/>
-                    <a:lstStyle/>
-                    <a:p>
-                      <a:pPr algn="ctr"/>
-                      <a:r>
-                        <a:rPr lang="en-US" dirty="0" smtClean="0"/>
-                        <a:t>1</a:t>
-                      </a:r>
-                      <a:endParaRPr lang="en-US" dirty="0"/>
-                    </a:p>
-                  </a:txBody>
-                  <a:tcPr/>
-                </a:tc>
-                <a:tc>
-                  <a:txBody>
-                    <a:bodyPr/>
-                    <a:lstStyle/>
-                    <a:p>
-                      <a:pPr algn="ctr"/>
-                      <a:r>
-                        <a:rPr lang="en-US" dirty="0" smtClean="0"/>
-                        <a:t>1/3 * 1/N + 1/8</a:t>
-                      </a:r>
-                      <a:r>
-                        <a:rPr lang="en-US" baseline="0" dirty="0" smtClean="0"/>
-                        <a:t> * 1/N + </a:t>
-                      </a:r>
-                      <a:r>
-                        <a:rPr lang="mr-IN" baseline="0" dirty="0" smtClean="0"/>
-                        <a:t>……</a:t>
-                      </a:r>
-                      <a:endParaRPr lang="en-US" dirty="0"/>
-                    </a:p>
-                  </a:txBody>
-                  <a:tcPr/>
-                </a:tc>
-              </a:tr>
-              <a:tr h="230235">
-                <a:tc>
-                  <a:txBody>
-                    <a:bodyPr/>
-                    <a:lstStyle/>
-                    <a:p>
-                      <a:pPr algn="ctr"/>
-                      <a:r>
-                        <a:rPr lang="en-US" dirty="0" smtClean="0"/>
-                        <a:t>2</a:t>
-                      </a:r>
-                      <a:endParaRPr lang="en-US" dirty="0"/>
-                    </a:p>
-                  </a:txBody>
-                  <a:tcPr/>
-                </a:tc>
-                <a:tc>
-                  <a:txBody>
-                    <a:bodyPr/>
-                    <a:lstStyle/>
-                    <a:p>
-                      <a:pPr algn="ctr"/>
-                      <a:r>
-                        <a:rPr lang="mr-IN" dirty="0" smtClean="0"/>
-                        <a:t>……</a:t>
-                      </a:r>
-                      <a:endParaRPr lang="en-US" dirty="0"/>
-                    </a:p>
-                  </a:txBody>
-                  <a:tcPr/>
-                </a:tc>
-              </a:tr>
-              <a:tr h="230235">
-                <a:tc>
-                  <a:txBody>
-                    <a:bodyPr/>
-                    <a:lstStyle/>
-                    <a:p>
-                      <a:pPr algn="ctr"/>
-                      <a:r>
-                        <a:rPr lang="en-US" dirty="0" smtClean="0"/>
-                        <a:t>3</a:t>
-                      </a:r>
-                      <a:endParaRPr lang="en-US" dirty="0"/>
-                    </a:p>
-                  </a:txBody>
-                  <a:tcPr/>
-                </a:tc>
-                <a:tc>
-                  <a:txBody>
-                    <a:bodyPr/>
-                    <a:lstStyle/>
-                    <a:p>
-                      <a:pPr algn="ctr"/>
-                      <a:r>
-                        <a:rPr lang="mr-IN" dirty="0" smtClean="0"/>
-                        <a:t>……</a:t>
-                      </a:r>
-                      <a:endParaRPr lang="en-US" dirty="0"/>
-                    </a:p>
-                  </a:txBody>
-                  <a:tcPr/>
-                </a:tc>
-              </a:tr>
-            </a:tbl>
-          </a:graphicData>
-        </a:graphic>
-      </p:graphicFrame>
-      <p:sp>
-        <p:nvSpPr>
-          <p:cNvPr id="35" name="TextBox 34"/>
-          <p:cNvSpPr txBox="1"/>
-          <p:nvPr/>
-        </p:nvSpPr>
-        <p:spPr>
-          <a:xfrm>
-            <a:off x="466681" y="653012"/>
-            <a:ext cx="1367244" cy="369332"/>
-          </a:xfrm>
-          <a:prstGeom prst="rect">
-            <a:avLst/>
-          </a:prstGeom>
-          <a:noFill/>
-        </p:spPr>
-        <p:txBody>
-          <a:bodyPr wrap="square" rtlCol="0">
-            <a:spAutoFit/>
-          </a:bodyPr>
-          <a:lstStyle/>
-          <a:p>
-            <a:pPr algn="ctr"/>
-            <a:r>
-              <a:rPr lang="en-US" smtClean="0"/>
-              <a:t>Input</a:t>
-            </a:r>
-            <a:endParaRPr lang="en-US" dirty="0"/>
-          </a:p>
-        </p:txBody>
-      </p:sp>
-      <p:sp>
-        <p:nvSpPr>
-          <p:cNvPr id="36" name="TextBox 35"/>
-          <p:cNvSpPr txBox="1"/>
-          <p:nvPr/>
-        </p:nvSpPr>
-        <p:spPr>
-          <a:xfrm>
-            <a:off x="10134601" y="822604"/>
-            <a:ext cx="1367244" cy="369332"/>
-          </a:xfrm>
-          <a:prstGeom prst="rect">
-            <a:avLst/>
-          </a:prstGeom>
-          <a:noFill/>
-        </p:spPr>
-        <p:txBody>
-          <a:bodyPr wrap="square" rtlCol="0">
-            <a:spAutoFit/>
-          </a:bodyPr>
-          <a:lstStyle/>
-          <a:p>
-            <a:pPr algn="ctr"/>
-            <a:r>
-              <a:rPr lang="en-US" dirty="0" smtClean="0"/>
-              <a:t>Output</a:t>
-            </a:r>
-            <a:endParaRPr lang="en-US" dirty="0"/>
-          </a:p>
-        </p:txBody>
-      </p:sp>
-      <p:graphicFrame>
-        <p:nvGraphicFramePr>
-          <p:cNvPr id="37" name="Table 36"/>
-          <p:cNvGraphicFramePr>
-            <a:graphicFrameLocks noGrp="1"/>
-          </p:cNvGraphicFramePr>
-          <p:nvPr>
-            <p:extLst>
-              <p:ext uri="{D42A27DB-BD31-4B8C-83A1-F6EECF244321}">
-                <p14:modId xmlns:p14="http://schemas.microsoft.com/office/powerpoint/2010/main" val="390959424"/>
-              </p:ext>
-            </p:extLst>
-          </p:nvPr>
-        </p:nvGraphicFramePr>
-        <p:xfrm>
-          <a:off x="10134600" y="4819135"/>
-          <a:ext cx="1849707" cy="1828800"/>
-        </p:xfrm>
-        <a:graphic>
-          <a:graphicData uri="http://schemas.openxmlformats.org/drawingml/2006/table">
-            <a:tbl>
-              <a:tblPr firstRow="1" bandRow="1">
-                <a:tableStyleId>{073A0DAA-6AF3-43AB-8588-CEC1D06C72B9}</a:tableStyleId>
-              </a:tblPr>
-              <a:tblGrid>
-                <a:gridCol w="644177"/>
-                <a:gridCol w="1205530"/>
-              </a:tblGrid>
-              <a:tr h="230235">
-                <a:tc>
-                  <a:txBody>
-                    <a:bodyPr/>
-                    <a:lstStyle/>
-                    <a:p>
-                      <a:pPr algn="ctr"/>
-                      <a:r>
-                        <a:rPr lang="en-US" dirty="0" smtClean="0"/>
-                        <a:t>Page</a:t>
-                      </a:r>
-                      <a:endParaRPr lang="en-US" dirty="0"/>
-                    </a:p>
-                  </a:txBody>
-                  <a:tcPr/>
-                </a:tc>
-                <a:tc>
-                  <a:txBody>
-                    <a:bodyPr/>
-                    <a:lstStyle/>
-                    <a:p>
-                      <a:pPr algn="ctr"/>
-                      <a:r>
-                        <a:rPr lang="en-US" dirty="0" smtClean="0"/>
-                        <a:t>Page</a:t>
-                      </a:r>
-                      <a:r>
-                        <a:rPr lang="en-US" baseline="0" dirty="0" smtClean="0"/>
-                        <a:t> Rank</a:t>
-                      </a:r>
-                      <a:endParaRPr lang="en-US" dirty="0"/>
-                    </a:p>
-                  </a:txBody>
-                  <a:tcPr/>
-                </a:tc>
-              </a:tr>
-              <a:tr h="230235">
-                <a:tc>
-                  <a:txBody>
-                    <a:bodyPr/>
-                    <a:lstStyle/>
-                    <a:p>
-                      <a:pPr algn="ctr"/>
-                      <a:r>
-                        <a:rPr lang="en-US" dirty="0" smtClean="0"/>
-                        <a:t>1</a:t>
-                      </a:r>
-                      <a:endParaRPr lang="en-US" dirty="0"/>
-                    </a:p>
-                  </a:txBody>
-                  <a:tcPr/>
-                </a:tc>
-                <a:tc>
-                  <a:txBody>
-                    <a:bodyPr/>
-                    <a:lstStyle/>
-                    <a:p>
-                      <a:pPr algn="ctr"/>
-                      <a:r>
-                        <a:rPr lang="en-US" dirty="0" smtClean="0"/>
-                        <a:t>value1</a:t>
-                      </a:r>
-                      <a:endParaRPr lang="en-US" dirty="0"/>
-                    </a:p>
-                  </a:txBody>
-                  <a:tcPr/>
-                </a:tc>
-              </a:tr>
-              <a:tr h="230235">
-                <a:tc>
-                  <a:txBody>
-                    <a:bodyPr/>
-                    <a:lstStyle/>
-                    <a:p>
-                      <a:pPr algn="ctr"/>
-                      <a:r>
-                        <a:rPr lang="en-US" dirty="0" smtClean="0"/>
-                        <a:t>2</a:t>
-                      </a:r>
-                      <a:endParaRPr lang="en-US" dirty="0"/>
-                    </a:p>
-                  </a:txBody>
-                  <a:tcPr/>
-                </a:tc>
-                <a:tc>
-                  <a:txBody>
-                    <a:bodyPr/>
-                    <a:lstStyle/>
-                    <a:p>
-                      <a:pPr algn="ctr"/>
-                      <a:r>
-                        <a:rPr lang="en-US" dirty="0" smtClean="0"/>
-                        <a:t>value2</a:t>
-                      </a:r>
-                      <a:endParaRPr lang="en-US" dirty="0"/>
-                    </a:p>
-                  </a:txBody>
-                  <a:tcPr/>
-                </a:tc>
-              </a:tr>
-              <a:tr h="230235">
-                <a:tc>
-                  <a:txBody>
-                    <a:bodyPr/>
-                    <a:lstStyle/>
-                    <a:p>
-                      <a:pPr algn="ctr"/>
-                      <a:r>
-                        <a:rPr lang="en-US" dirty="0" smtClean="0"/>
-                        <a:t>3</a:t>
-                      </a:r>
-                      <a:endParaRPr lang="en-US" dirty="0"/>
-                    </a:p>
-                  </a:txBody>
-                  <a:tcPr/>
-                </a:tc>
-                <a:tc>
-                  <a:txBody>
-                    <a:bodyPr/>
-                    <a:lstStyle/>
-                    <a:p>
-                      <a:pPr algn="ctr"/>
-                      <a:r>
-                        <a:rPr lang="en-US" dirty="0" smtClean="0"/>
-                        <a:t>value3</a:t>
-                      </a:r>
-                      <a:endParaRPr lang="en-US" dirty="0"/>
-                    </a:p>
-                  </a:txBody>
-                  <a:tcPr/>
-                </a:tc>
-              </a:tr>
-              <a:tr h="230235">
-                <a:tc>
-                  <a:txBody>
-                    <a:bodyPr/>
-                    <a:lstStyle/>
-                    <a:p>
-                      <a:pPr algn="ctr"/>
-                      <a:r>
-                        <a:rPr lang="en-US" dirty="0" smtClean="0"/>
-                        <a:t>4</a:t>
-                      </a:r>
-                      <a:endParaRPr lang="en-US" dirty="0"/>
-                    </a:p>
-                  </a:txBody>
-                  <a:tcPr/>
-                </a:tc>
-                <a:tc>
-                  <a:txBody>
-                    <a:bodyPr/>
-                    <a:lstStyle/>
-                    <a:p>
-                      <a:pPr algn="ctr"/>
-                      <a:r>
-                        <a:rPr lang="en-US" dirty="0" smtClean="0"/>
-                        <a:t>value4</a:t>
-                      </a:r>
-                      <a:endParaRPr lang="en-US" dirty="0"/>
-                    </a:p>
-                  </a:txBody>
-                  <a:tcPr/>
-                </a:tc>
-              </a:tr>
-            </a:tbl>
-          </a:graphicData>
-        </a:graphic>
-      </p:graphicFrame>
-      <p:sp>
-        <p:nvSpPr>
-          <p:cNvPr id="3" name="U-Turn Arrow 2"/>
+          <p:cNvPr id="41" name="Rounded Rectangle 40"/>
           <p:cNvSpPr/>
           <p:nvPr/>
         </p:nvSpPr>
         <p:spPr>
-          <a:xfrm rot="10800000">
-            <a:off x="4280598" y="3532055"/>
-            <a:ext cx="3557116" cy="771806"/>
-          </a:xfrm>
-          <a:prstGeom prst="uturnArrow">
-            <a:avLst>
-              <a:gd name="adj1" fmla="val 19852"/>
-              <a:gd name="adj2" fmla="val 25000"/>
-              <a:gd name="adj3" fmla="val 25000"/>
-              <a:gd name="adj4" fmla="val 43750"/>
-              <a:gd name="adj5" fmla="val 100000"/>
-            </a:avLst>
+          <a:xfrm>
+            <a:off x="5616215" y="2236118"/>
+            <a:ext cx="1079359" cy="2121763"/>
+          </a:xfrm>
+          <a:prstGeom prst="roundRect">
+            <a:avLst/>
           </a:prstGeom>
           <a:solidFill>
             <a:schemeClr val="bg2"/>
           </a:solidFill>
-          <a:ln>
-            <a:solidFill>
-              <a:schemeClr val="accent1">
-                <a:lumMod val="50000"/>
-              </a:schemeClr>
-            </a:solidFill>
-          </a:ln>
         </p:spPr>
         <p:style>
           <a:lnRef idx="2">
@@ -4980,8 +4171,7 @@
           <a:bodyPr rtlCol="0" anchor="ctr"/>
           <a:lstStyle/>
           <a:p>
-            <a:pPr algn="ctr"/>
-            <a:endParaRPr lang="en-US">
+            <a:endParaRPr lang="en-US" dirty="0">
               <a:solidFill>
                 <a:schemeClr val="tx1"/>
               </a:solidFill>
@@ -4991,14 +4181,143 @@
       </p:sp>
       <p:sp>
         <p:nvSpPr>
-          <p:cNvPr id="32" name="TextBox 31"/>
+          <p:cNvPr id="42" name="Rounded Rectangle 41"/>
+          <p:cNvSpPr/>
+          <p:nvPr/>
+        </p:nvSpPr>
+        <p:spPr>
+          <a:xfrm>
+            <a:off x="7390239" y="2236118"/>
+            <a:ext cx="1079359" cy="2121763"/>
+          </a:xfrm>
+          <a:prstGeom prst="roundRect">
+            <a:avLst/>
+          </a:prstGeom>
+          <a:solidFill>
+            <a:schemeClr val="bg2"/>
+          </a:solidFill>
+        </p:spPr>
+        <p:style>
+          <a:lnRef idx="2">
+            <a:schemeClr val="accent1">
+              <a:shade val="50000"/>
+            </a:schemeClr>
+          </a:lnRef>
+          <a:fillRef idx="1">
+            <a:schemeClr val="accent1"/>
+          </a:fillRef>
+          <a:effectRef idx="0">
+            <a:schemeClr val="accent1"/>
+          </a:effectRef>
+          <a:fontRef idx="minor">
+            <a:schemeClr val="lt1"/>
+          </a:fontRef>
+        </p:style>
+        <p:txBody>
+          <a:bodyPr rtlCol="0" anchor="ctr"/>
+          <a:lstStyle/>
+          <a:p>
+            <a:pPr algn="ctr"/>
+            <a:endParaRPr lang="en-US"/>
+          </a:p>
+        </p:txBody>
+      </p:sp>
+      <p:sp>
+        <p:nvSpPr>
+          <p:cNvPr id="43" name="Right Arrow 42"/>
+          <p:cNvSpPr/>
+          <p:nvPr/>
+        </p:nvSpPr>
+        <p:spPr>
+          <a:xfrm>
+            <a:off x="6768996" y="3045263"/>
+            <a:ext cx="528294" cy="307410"/>
+          </a:xfrm>
+          <a:prstGeom prst="rightArrow">
+            <a:avLst/>
+          </a:prstGeom>
+          <a:solidFill>
+            <a:schemeClr val="bg2"/>
+          </a:solidFill>
+        </p:spPr>
+        <p:style>
+          <a:lnRef idx="2">
+            <a:schemeClr val="accent1">
+              <a:shade val="50000"/>
+            </a:schemeClr>
+          </a:lnRef>
+          <a:fillRef idx="1">
+            <a:schemeClr val="accent1"/>
+          </a:fillRef>
+          <a:effectRef idx="0">
+            <a:schemeClr val="accent1"/>
+          </a:effectRef>
+          <a:fontRef idx="minor">
+            <a:schemeClr val="lt1"/>
+          </a:fontRef>
+        </p:style>
+        <p:txBody>
+          <a:bodyPr rtlCol="0" anchor="ctr"/>
+          <a:lstStyle/>
+          <a:p>
+            <a:pPr algn="ctr"/>
+            <a:endParaRPr lang="en-US" sz="1700"/>
+          </a:p>
+        </p:txBody>
+      </p:sp>
+      <p:sp>
+        <p:nvSpPr>
+          <p:cNvPr id="44" name="Right Arrow 43"/>
+          <p:cNvSpPr/>
+          <p:nvPr/>
+        </p:nvSpPr>
+        <p:spPr>
+          <a:xfrm>
+            <a:off x="10289355" y="3045183"/>
+            <a:ext cx="528294" cy="307410"/>
+          </a:xfrm>
+          <a:prstGeom prst="rightArrow">
+            <a:avLst/>
+          </a:prstGeom>
+          <a:solidFill>
+            <a:schemeClr val="bg2"/>
+          </a:solidFill>
+        </p:spPr>
+        <p:style>
+          <a:lnRef idx="2">
+            <a:schemeClr val="accent1">
+              <a:shade val="50000"/>
+            </a:schemeClr>
+          </a:lnRef>
+          <a:fillRef idx="1">
+            <a:schemeClr val="accent1"/>
+          </a:fillRef>
+          <a:effectRef idx="0">
+            <a:schemeClr val="accent1"/>
+          </a:effectRef>
+          <a:fontRef idx="minor">
+            <a:schemeClr val="lt1"/>
+          </a:fontRef>
+        </p:style>
+        <p:txBody>
+          <a:bodyPr rtlCol="0" anchor="ctr"/>
+          <a:lstStyle/>
+          <a:p>
+            <a:pPr algn="ctr"/>
+            <a:endParaRPr lang="en-US" sz="1700"/>
+          </a:p>
+        </p:txBody>
+      </p:sp>
+      <p:sp>
+        <p:nvSpPr>
+          <p:cNvPr id="45" name="TextBox 44"/>
           <p:cNvSpPr txBox="1"/>
           <p:nvPr/>
         </p:nvSpPr>
         <p:spPr>
           <a:xfrm>
-            <a:off x="5396792" y="3703328"/>
-            <a:ext cx="1367244" cy="369332"/>
+            <a:off x="5616865" y="1716217"/>
+            <a:ext cx="1075931" cy="369332"/>
           </a:xfrm>
           <a:prstGeom prst="rect">
             <a:avLst/>
@@ -5014,7 +4333,7 @@
             <a:pPr algn="ctr"/>
             <a:r>
               <a:rPr lang="en-US" dirty="0" smtClean="0"/>
-              <a:t>Iteration</a:t>
+              <a:t>Job 3</a:t>
             </a:r>
             <a:endParaRPr lang="en-US" dirty="0"/>
           </a:p>
@@ -5022,14 +4341,14 @@
       </p:sp>
       <p:sp>
         <p:nvSpPr>
-          <p:cNvPr id="33" name="TextBox 32"/>
+          <p:cNvPr id="46" name="TextBox 45"/>
           <p:cNvSpPr txBox="1"/>
           <p:nvPr/>
         </p:nvSpPr>
         <p:spPr>
           <a:xfrm>
-            <a:off x="3378935" y="4444747"/>
-            <a:ext cx="2449767" cy="369332"/>
+            <a:off x="7396802" y="1745544"/>
+            <a:ext cx="1079361" cy="369332"/>
           </a:xfrm>
           <a:prstGeom prst="rect">
             <a:avLst/>
@@ -5044,8 +4363,8 @@
           <a:p>
             <a:pPr algn="ctr"/>
             <a:r>
-              <a:rPr lang="en-US" smtClean="0"/>
-              <a:t>Input to Job 1 Reducer</a:t>
+              <a:rPr lang="en-US" dirty="0" smtClean="0"/>
+              <a:t>Job 4</a:t>
             </a:r>
             <a:endParaRPr lang="en-US" dirty="0"/>
           </a:p>
@@ -5053,14 +4372,14 @@
       </p:sp>
       <p:sp>
         <p:nvSpPr>
-          <p:cNvPr id="38" name="TextBox 37"/>
+          <p:cNvPr id="50" name="TextBox 49"/>
           <p:cNvSpPr txBox="1"/>
           <p:nvPr/>
         </p:nvSpPr>
         <p:spPr>
           <a:xfrm>
-            <a:off x="7070754" y="4444747"/>
-            <a:ext cx="2449767" cy="369332"/>
+            <a:off x="7377109" y="2575892"/>
+            <a:ext cx="1075931" cy="353943"/>
           </a:xfrm>
           <a:prstGeom prst="rect">
             <a:avLst/>
@@ -5075,23 +4394,23 @@
           <a:p>
             <a:pPr algn="ctr"/>
             <a:r>
-              <a:rPr lang="en-US" smtClean="0"/>
-              <a:t>Job 2 Reducer</a:t>
-            </a:r>
-            <a:endParaRPr lang="en-US" dirty="0"/>
-          </a:p>
-        </p:txBody>
-      </p:sp>
-      <p:sp>
-        <p:nvSpPr>
-          <p:cNvPr id="39" name="TextBox 38"/>
+              <a:rPr lang="en-US" sz="1700" smtClean="0"/>
+              <a:t>Mapper 1</a:t>
+            </a:r>
+            <a:endParaRPr lang="en-US" sz="1700" dirty="0"/>
+          </a:p>
+        </p:txBody>
+      </p:sp>
+      <p:sp>
+        <p:nvSpPr>
+          <p:cNvPr id="51" name="TextBox 50"/>
           <p:cNvSpPr txBox="1"/>
           <p:nvPr/>
         </p:nvSpPr>
         <p:spPr>
           <a:xfrm>
-            <a:off x="9834569" y="4431992"/>
-            <a:ext cx="2449767" cy="369332"/>
+            <a:off x="7377109" y="3611347"/>
+            <a:ext cx="1075931" cy="353943"/>
           </a:xfrm>
           <a:prstGeom prst="rect">
             <a:avLst/>
@@ -5106,23 +4425,23 @@
           <a:p>
             <a:pPr algn="ctr"/>
             <a:r>
-              <a:rPr lang="en-US" dirty="0" smtClean="0"/>
-              <a:t>Job 2 Reducer Output</a:t>
-            </a:r>
-            <a:endParaRPr lang="en-US" dirty="0"/>
-          </a:p>
-        </p:txBody>
-      </p:sp>
-      <p:sp>
-        <p:nvSpPr>
-          <p:cNvPr id="40" name="TextBox 39"/>
+              <a:rPr lang="en-US" sz="1700" dirty="0" smtClean="0"/>
+              <a:t>Reducer</a:t>
+            </a:r>
+            <a:endParaRPr lang="en-US" sz="1700" dirty="0"/>
+          </a:p>
+        </p:txBody>
+      </p:sp>
+      <p:sp>
+        <p:nvSpPr>
+          <p:cNvPr id="52" name="TextBox 51"/>
           <p:cNvSpPr txBox="1"/>
           <p:nvPr/>
         </p:nvSpPr>
         <p:spPr>
           <a:xfrm>
-            <a:off x="7018756" y="2192114"/>
-            <a:ext cx="1367244" cy="369332"/>
+            <a:off x="7361527" y="3100892"/>
+            <a:ext cx="1075931" cy="353943"/>
           </a:xfrm>
           <a:prstGeom prst="rect">
             <a:avLst/>
@@ -5137,13 +4456,565 @@
           <a:p>
             <a:pPr algn="ctr"/>
             <a:r>
-              <a:rPr lang="en-US" smtClean="0"/>
+              <a:rPr lang="en-US" sz="1700" smtClean="0"/>
               <a:t>Mapper 2</a:t>
             </a:r>
+            <a:endParaRPr lang="en-US" sz="1700" dirty="0"/>
+          </a:p>
+        </p:txBody>
+      </p:sp>
+      <p:sp>
+        <p:nvSpPr>
+          <p:cNvPr id="53" name="Rounded Rectangle 52"/>
+          <p:cNvSpPr/>
+          <p:nvPr/>
+        </p:nvSpPr>
+        <p:spPr>
+          <a:xfrm>
+            <a:off x="9167041" y="2236118"/>
+            <a:ext cx="1079359" cy="2121763"/>
+          </a:xfrm>
+          <a:prstGeom prst="roundRect">
+            <a:avLst/>
+          </a:prstGeom>
+          <a:solidFill>
+            <a:schemeClr val="bg2"/>
+          </a:solidFill>
+        </p:spPr>
+        <p:style>
+          <a:lnRef idx="2">
+            <a:schemeClr val="accent1">
+              <a:shade val="50000"/>
+            </a:schemeClr>
+          </a:lnRef>
+          <a:fillRef idx="1">
+            <a:schemeClr val="accent1"/>
+          </a:fillRef>
+          <a:effectRef idx="0">
+            <a:schemeClr val="accent1"/>
+          </a:effectRef>
+          <a:fontRef idx="minor">
+            <a:schemeClr val="lt1"/>
+          </a:fontRef>
+        </p:style>
+        <p:txBody>
+          <a:bodyPr rtlCol="0" anchor="ctr"/>
+          <a:lstStyle/>
+          <a:p>
+            <a:pPr algn="ctr"/>
+            <a:endParaRPr lang="en-US"/>
+          </a:p>
+        </p:txBody>
+      </p:sp>
+      <p:sp>
+        <p:nvSpPr>
+          <p:cNvPr id="54" name="Right Arrow 53"/>
+          <p:cNvSpPr/>
+          <p:nvPr/>
+        </p:nvSpPr>
+        <p:spPr>
+          <a:xfrm>
+            <a:off x="8534940" y="3042968"/>
+            <a:ext cx="528294" cy="307410"/>
+          </a:xfrm>
+          <a:prstGeom prst="rightArrow">
+            <a:avLst/>
+          </a:prstGeom>
+          <a:solidFill>
+            <a:schemeClr val="bg2"/>
+          </a:solidFill>
+        </p:spPr>
+        <p:style>
+          <a:lnRef idx="2">
+            <a:schemeClr val="accent1">
+              <a:shade val="50000"/>
+            </a:schemeClr>
+          </a:lnRef>
+          <a:fillRef idx="1">
+            <a:schemeClr val="accent1"/>
+          </a:fillRef>
+          <a:effectRef idx="0">
+            <a:schemeClr val="accent1"/>
+          </a:effectRef>
+          <a:fontRef idx="minor">
+            <a:schemeClr val="lt1"/>
+          </a:fontRef>
+        </p:style>
+        <p:txBody>
+          <a:bodyPr rtlCol="0" anchor="ctr"/>
+          <a:lstStyle/>
+          <a:p>
+            <a:pPr algn="ctr"/>
+            <a:endParaRPr lang="en-US" sz="1700"/>
+          </a:p>
+        </p:txBody>
+      </p:sp>
+      <p:sp>
+        <p:nvSpPr>
+          <p:cNvPr id="55" name="TextBox 54"/>
+          <p:cNvSpPr txBox="1"/>
+          <p:nvPr/>
+        </p:nvSpPr>
+        <p:spPr>
+          <a:xfrm>
+            <a:off x="9180169" y="1713462"/>
+            <a:ext cx="1079361" cy="369332"/>
+          </a:xfrm>
+          <a:prstGeom prst="rect">
+            <a:avLst/>
+          </a:prstGeom>
+          <a:noFill/>
+        </p:spPr>
+        <p:txBody>
+          <a:bodyPr wrap="square" rtlCol="0">
+            <a:spAutoFit/>
+          </a:bodyPr>
+          <a:lstStyle/>
+          <a:p>
+            <a:pPr algn="ctr"/>
+            <a:r>
+              <a:rPr lang="en-US" dirty="0" smtClean="0"/>
+              <a:t>Job 5</a:t>
+            </a:r>
             <a:endParaRPr lang="en-US" dirty="0"/>
           </a:p>
         </p:txBody>
       </p:sp>
+      <p:sp>
+        <p:nvSpPr>
+          <p:cNvPr id="59" name="TextBox 58"/>
+          <p:cNvSpPr txBox="1"/>
+          <p:nvPr/>
+        </p:nvSpPr>
+        <p:spPr>
+          <a:xfrm>
+            <a:off x="3872626" y="2788254"/>
+            <a:ext cx="1075931" cy="353943"/>
+          </a:xfrm>
+          <a:prstGeom prst="rect">
+            <a:avLst/>
+          </a:prstGeom>
+          <a:noFill/>
+        </p:spPr>
+        <p:txBody>
+          <a:bodyPr wrap="square" rtlCol="0">
+            <a:spAutoFit/>
+          </a:bodyPr>
+          <a:lstStyle/>
+          <a:p>
+            <a:pPr algn="ctr"/>
+            <a:r>
+              <a:rPr lang="en-US" sz="1700" dirty="0" smtClean="0"/>
+              <a:t>Mapper</a:t>
+            </a:r>
+            <a:endParaRPr lang="en-US" sz="1700" dirty="0"/>
+          </a:p>
+        </p:txBody>
+      </p:sp>
+      <p:sp>
+        <p:nvSpPr>
+          <p:cNvPr id="60" name="TextBox 59"/>
+          <p:cNvSpPr txBox="1"/>
+          <p:nvPr/>
+        </p:nvSpPr>
+        <p:spPr>
+          <a:xfrm>
+            <a:off x="3881842" y="3334493"/>
+            <a:ext cx="1075931" cy="353943"/>
+          </a:xfrm>
+          <a:prstGeom prst="rect">
+            <a:avLst/>
+          </a:prstGeom>
+          <a:noFill/>
+        </p:spPr>
+        <p:txBody>
+          <a:bodyPr wrap="square" rtlCol="0">
+            <a:spAutoFit/>
+          </a:bodyPr>
+          <a:lstStyle/>
+          <a:p>
+            <a:pPr algn="ctr"/>
+            <a:r>
+              <a:rPr lang="en-US" sz="1700" dirty="0" smtClean="0"/>
+              <a:t>Reducer</a:t>
+            </a:r>
+            <a:endParaRPr lang="en-US" sz="1700" dirty="0"/>
+          </a:p>
+        </p:txBody>
+      </p:sp>
+      <p:sp>
+        <p:nvSpPr>
+          <p:cNvPr id="69" name="TextBox 68"/>
+          <p:cNvSpPr txBox="1"/>
+          <p:nvPr/>
+        </p:nvSpPr>
+        <p:spPr>
+          <a:xfrm>
+            <a:off x="5613371" y="2783213"/>
+            <a:ext cx="1075931" cy="353943"/>
+          </a:xfrm>
+          <a:prstGeom prst="rect">
+            <a:avLst/>
+          </a:prstGeom>
+          <a:noFill/>
+        </p:spPr>
+        <p:txBody>
+          <a:bodyPr wrap="square" rtlCol="0">
+            <a:spAutoFit/>
+          </a:bodyPr>
+          <a:lstStyle/>
+          <a:p>
+            <a:pPr algn="ctr"/>
+            <a:r>
+              <a:rPr lang="en-US" sz="1700" dirty="0" smtClean="0"/>
+              <a:t>Mapper</a:t>
+            </a:r>
+            <a:endParaRPr lang="en-US" sz="1700" dirty="0"/>
+          </a:p>
+        </p:txBody>
+      </p:sp>
+      <p:sp>
+        <p:nvSpPr>
+          <p:cNvPr id="70" name="TextBox 69"/>
+          <p:cNvSpPr txBox="1"/>
+          <p:nvPr/>
+        </p:nvSpPr>
+        <p:spPr>
+          <a:xfrm>
+            <a:off x="5622587" y="3329452"/>
+            <a:ext cx="1075931" cy="353943"/>
+          </a:xfrm>
+          <a:prstGeom prst="rect">
+            <a:avLst/>
+          </a:prstGeom>
+          <a:noFill/>
+        </p:spPr>
+        <p:txBody>
+          <a:bodyPr wrap="square" rtlCol="0">
+            <a:spAutoFit/>
+          </a:bodyPr>
+          <a:lstStyle/>
+          <a:p>
+            <a:pPr algn="ctr"/>
+            <a:r>
+              <a:rPr lang="en-US" sz="1700" dirty="0" smtClean="0"/>
+              <a:t>Reducer</a:t>
+            </a:r>
+            <a:endParaRPr lang="en-US" sz="1700" dirty="0"/>
+          </a:p>
+        </p:txBody>
+      </p:sp>
+      <p:sp>
+        <p:nvSpPr>
+          <p:cNvPr id="71" name="TextBox 70"/>
+          <p:cNvSpPr txBox="1"/>
+          <p:nvPr/>
+        </p:nvSpPr>
+        <p:spPr>
+          <a:xfrm>
+            <a:off x="9158376" y="2752863"/>
+            <a:ext cx="1075931" cy="353943"/>
+          </a:xfrm>
+          <a:prstGeom prst="rect">
+            <a:avLst/>
+          </a:prstGeom>
+          <a:noFill/>
+        </p:spPr>
+        <p:txBody>
+          <a:bodyPr wrap="square" rtlCol="0">
+            <a:spAutoFit/>
+          </a:bodyPr>
+          <a:lstStyle/>
+          <a:p>
+            <a:pPr algn="ctr"/>
+            <a:r>
+              <a:rPr lang="en-US" sz="1700" dirty="0" smtClean="0"/>
+              <a:t>Mapper</a:t>
+            </a:r>
+            <a:endParaRPr lang="en-US" sz="1700" dirty="0"/>
+          </a:p>
+        </p:txBody>
+      </p:sp>
+      <p:sp>
+        <p:nvSpPr>
+          <p:cNvPr id="72" name="TextBox 71"/>
+          <p:cNvSpPr txBox="1"/>
+          <p:nvPr/>
+        </p:nvSpPr>
+        <p:spPr>
+          <a:xfrm>
+            <a:off x="9167592" y="3299102"/>
+            <a:ext cx="1075931" cy="353943"/>
+          </a:xfrm>
+          <a:prstGeom prst="rect">
+            <a:avLst/>
+          </a:prstGeom>
+          <a:noFill/>
+        </p:spPr>
+        <p:txBody>
+          <a:bodyPr wrap="square" rtlCol="0">
+            <a:spAutoFit/>
+          </a:bodyPr>
+          <a:lstStyle/>
+          <a:p>
+            <a:pPr algn="ctr"/>
+            <a:r>
+              <a:rPr lang="en-US" sz="1700" dirty="0" smtClean="0"/>
+              <a:t>Reducer</a:t>
+            </a:r>
+            <a:endParaRPr lang="en-US" sz="1700" dirty="0"/>
+          </a:p>
+        </p:txBody>
+      </p:sp>
+      <p:sp>
+        <p:nvSpPr>
+          <p:cNvPr id="73" name="TextBox 72"/>
+          <p:cNvSpPr txBox="1"/>
+          <p:nvPr/>
+        </p:nvSpPr>
+        <p:spPr>
+          <a:xfrm>
+            <a:off x="2096471" y="4598265"/>
+            <a:ext cx="2822948" cy="646331"/>
+          </a:xfrm>
+          <a:prstGeom prst="rect">
+            <a:avLst/>
+          </a:prstGeom>
+          <a:noFill/>
+        </p:spPr>
+        <p:txBody>
+          <a:bodyPr wrap="square" rtlCol="0">
+            <a:spAutoFit/>
+          </a:bodyPr>
+          <a:lstStyle/>
+          <a:p>
+            <a:pPr algn="ctr"/>
+            <a:r>
+              <a:rPr lang="en-US" smtClean="0"/>
+              <a:t>Build original un-normalized </a:t>
+            </a:r>
+            <a:endParaRPr lang="en-US" dirty="0" smtClean="0"/>
+          </a:p>
+          <a:p>
+            <a:pPr algn="ctr"/>
+            <a:r>
+              <a:rPr lang="en-US" dirty="0" smtClean="0"/>
+              <a:t>co-occurrence matrix</a:t>
+            </a:r>
+            <a:endParaRPr lang="en-US" dirty="0"/>
+          </a:p>
+        </p:txBody>
+      </p:sp>
+      <p:sp>
+        <p:nvSpPr>
+          <p:cNvPr id="74" name="TextBox 73"/>
+          <p:cNvSpPr txBox="1"/>
+          <p:nvPr/>
+        </p:nvSpPr>
+        <p:spPr>
+          <a:xfrm>
+            <a:off x="5076536" y="4601149"/>
+            <a:ext cx="2284991" cy="646331"/>
+          </a:xfrm>
+          <a:prstGeom prst="rect">
+            <a:avLst/>
+          </a:prstGeom>
+          <a:noFill/>
+        </p:spPr>
+        <p:txBody>
+          <a:bodyPr wrap="square" rtlCol="0">
+            <a:spAutoFit/>
+          </a:bodyPr>
+          <a:lstStyle/>
+          <a:p>
+            <a:pPr algn="ctr"/>
+            <a:r>
+              <a:rPr lang="en-US" dirty="0" smtClean="0"/>
+              <a:t>Normalize the co-occurrence matrix</a:t>
+            </a:r>
+            <a:endParaRPr lang="en-US" dirty="0"/>
+          </a:p>
+        </p:txBody>
+      </p:sp>
+      <p:sp>
+        <p:nvSpPr>
+          <p:cNvPr id="75" name="TextBox 74"/>
+          <p:cNvSpPr txBox="1"/>
+          <p:nvPr/>
+        </p:nvSpPr>
+        <p:spPr>
+          <a:xfrm>
+            <a:off x="7289848" y="4581810"/>
+            <a:ext cx="3275763" cy="923330"/>
+          </a:xfrm>
+          <a:prstGeom prst="rect">
+            <a:avLst/>
+          </a:prstGeom>
+          <a:noFill/>
+        </p:spPr>
+        <p:txBody>
+          <a:bodyPr wrap="square" rtlCol="0">
+            <a:spAutoFit/>
+          </a:bodyPr>
+          <a:lstStyle/>
+          <a:p>
+            <a:pPr algn="ctr"/>
+            <a:r>
+              <a:rPr lang="en-US" dirty="0" smtClean="0"/>
+              <a:t>Multiply normalized co-occurrence matrix with </a:t>
+            </a:r>
+            <a:r>
+              <a:rPr lang="en-US" smtClean="0"/>
+              <a:t>user rating matrix to make prediction</a:t>
+            </a:r>
+            <a:endParaRPr lang="en-US" dirty="0"/>
+          </a:p>
+        </p:txBody>
+      </p:sp>
+      <p:cxnSp>
+        <p:nvCxnSpPr>
+          <p:cNvPr id="16" name="Straight Connector 15"/>
+          <p:cNvCxnSpPr/>
+          <p:nvPr/>
+        </p:nvCxnSpPr>
+        <p:spPr>
+          <a:xfrm>
+            <a:off x="1773938" y="1535640"/>
+            <a:ext cx="2310" cy="3871097"/>
+          </a:xfrm>
+          <a:prstGeom prst="line">
+            <a:avLst/>
+          </a:prstGeom>
+          <a:ln w="25400">
+            <a:solidFill>
+              <a:schemeClr val="accent1"/>
+            </a:solidFill>
+            <a:prstDash val="sysDot"/>
+          </a:ln>
+        </p:spPr>
+        <p:style>
+          <a:lnRef idx="1">
+            <a:schemeClr val="accent1"/>
+          </a:lnRef>
+          <a:fillRef idx="0">
+            <a:schemeClr val="accent1"/>
+          </a:fillRef>
+          <a:effectRef idx="0">
+            <a:schemeClr val="accent1"/>
+          </a:effectRef>
+          <a:fontRef idx="minor">
+            <a:schemeClr val="tx1"/>
+          </a:fontRef>
+        </p:style>
+      </p:cxnSp>
+      <p:cxnSp>
+        <p:nvCxnSpPr>
+          <p:cNvPr id="76" name="Straight Connector 75"/>
+          <p:cNvCxnSpPr/>
+          <p:nvPr/>
+        </p:nvCxnSpPr>
+        <p:spPr>
+          <a:xfrm>
+            <a:off x="5213083" y="1535640"/>
+            <a:ext cx="2310" cy="3871097"/>
+          </a:xfrm>
+          <a:prstGeom prst="line">
+            <a:avLst/>
+          </a:prstGeom>
+          <a:ln w="25400">
+            <a:solidFill>
+              <a:schemeClr val="accent1"/>
+            </a:solidFill>
+            <a:prstDash val="sysDot"/>
+          </a:ln>
+        </p:spPr>
+        <p:style>
+          <a:lnRef idx="1">
+            <a:schemeClr val="accent1"/>
+          </a:lnRef>
+          <a:fillRef idx="0">
+            <a:schemeClr val="accent1"/>
+          </a:fillRef>
+          <a:effectRef idx="0">
+            <a:schemeClr val="accent1"/>
+          </a:effectRef>
+          <a:fontRef idx="minor">
+            <a:schemeClr val="tx1"/>
+          </a:fontRef>
+        </p:style>
+      </p:cxnSp>
+      <p:cxnSp>
+        <p:nvCxnSpPr>
+          <p:cNvPr id="77" name="Straight Connector 76"/>
+          <p:cNvCxnSpPr/>
+          <p:nvPr/>
+        </p:nvCxnSpPr>
+        <p:spPr>
+          <a:xfrm>
+            <a:off x="10599568" y="1535640"/>
+            <a:ext cx="2310" cy="3871097"/>
+          </a:xfrm>
+          <a:prstGeom prst="line">
+            <a:avLst/>
+          </a:prstGeom>
+          <a:ln w="25400">
+            <a:solidFill>
+              <a:schemeClr val="accent1"/>
+            </a:solidFill>
+            <a:prstDash val="sysDot"/>
+          </a:ln>
+        </p:spPr>
+        <p:style>
+          <a:lnRef idx="1">
+            <a:schemeClr val="accent1"/>
+          </a:lnRef>
+          <a:fillRef idx="0">
+            <a:schemeClr val="accent1"/>
+          </a:fillRef>
+          <a:effectRef idx="0">
+            <a:schemeClr val="accent1"/>
+          </a:effectRef>
+          <a:fontRef idx="minor">
+            <a:schemeClr val="tx1"/>
+          </a:fontRef>
+        </p:style>
+      </p:cxnSp>
+      <p:cxnSp>
+        <p:nvCxnSpPr>
+          <p:cNvPr id="78" name="Straight Connector 77"/>
+          <p:cNvCxnSpPr/>
+          <p:nvPr/>
+        </p:nvCxnSpPr>
+        <p:spPr>
+          <a:xfrm>
+            <a:off x="7190062" y="1535640"/>
+            <a:ext cx="2310" cy="3871097"/>
+          </a:xfrm>
+          <a:prstGeom prst="line">
+            <a:avLst/>
+          </a:prstGeom>
+          <a:ln w="25400">
+            <a:solidFill>
+              <a:schemeClr val="accent1"/>
+            </a:solidFill>
+            <a:prstDash val="sysDot"/>
+          </a:ln>
+        </p:spPr>
+        <p:style>
+          <a:lnRef idx="1">
+            <a:schemeClr val="accent1"/>
+          </a:lnRef>
+          <a:fillRef idx="0">
+            <a:schemeClr val="accent1"/>
+          </a:fillRef>
+          <a:effectRef idx="0">
+            <a:schemeClr val="accent1"/>
+          </a:effectRef>
+          <a:fontRef idx="minor">
+            <a:schemeClr val="tx1"/>
+          </a:fontRef>
+        </p:style>
+      </p:cxnSp>
     </p:spTree>
     <p:extLst>
       <p:ext uri="{BB962C8B-B14F-4D97-AF65-F5344CB8AC3E}">
@@ -5154,6 +5025,13 @@
   <p:clrMapOvr>
     <a:masterClrMapping/>
   </p:clrMapOvr>
+  <p:timing>
+    <p:tnLst>
+      <p:par>
+        <p:cTn id="1" dur="indefinite" restart="never" nodeType="tmRoot"/>
+      </p:par>
+    </p:tnLst>
+  </p:timing>
 </p:sld>
 </file>
 

</xml_diff>